<commit_message>
updated the design diagram
</commit_message>
<xml_diff>
--- a/design/design.pptx
+++ b/design/design.pptx
@@ -195,7 +195,7 @@
             <a:fld id="{46099343-F74B-4921-8C0D-6D66A8A83ABE}" type="datetimeFigureOut">
               <a:rPr lang="en-US" smtClean="0"/>
               <a:pPr/>
-              <a:t>2/14/2011</a:t>
+              <a:t>4/9/2011</a:t>
             </a:fld>
             <a:endParaRPr lang="en-US"/>
           </a:p>
@@ -889,7 +889,7 @@
             <a:fld id="{B4F70677-8E11-4514-95B0-FACEE0366784}" type="datetimeFigureOut">
               <a:rPr lang="en-US" smtClean="0"/>
               <a:pPr/>
-              <a:t>2/14/2011</a:t>
+              <a:t>4/9/2011</a:t>
             </a:fld>
             <a:endParaRPr lang="en-US"/>
           </a:p>
@@ -1056,7 +1056,7 @@
             <a:fld id="{B4F70677-8E11-4514-95B0-FACEE0366784}" type="datetimeFigureOut">
               <a:rPr lang="en-US" smtClean="0"/>
               <a:pPr/>
-              <a:t>2/14/2011</a:t>
+              <a:t>4/9/2011</a:t>
             </a:fld>
             <a:endParaRPr lang="en-US"/>
           </a:p>
@@ -1233,7 +1233,7 @@
             <a:fld id="{B4F70677-8E11-4514-95B0-FACEE0366784}" type="datetimeFigureOut">
               <a:rPr lang="en-US" smtClean="0"/>
               <a:pPr/>
-              <a:t>2/14/2011</a:t>
+              <a:t>4/9/2011</a:t>
             </a:fld>
             <a:endParaRPr lang="en-US"/>
           </a:p>
@@ -1400,7 +1400,7 @@
             <a:fld id="{B4F70677-8E11-4514-95B0-FACEE0366784}" type="datetimeFigureOut">
               <a:rPr lang="en-US" smtClean="0"/>
               <a:pPr/>
-              <a:t>2/14/2011</a:t>
+              <a:t>4/9/2011</a:t>
             </a:fld>
             <a:endParaRPr lang="en-US"/>
           </a:p>
@@ -1643,7 +1643,7 @@
             <a:fld id="{B4F70677-8E11-4514-95B0-FACEE0366784}" type="datetimeFigureOut">
               <a:rPr lang="en-US" smtClean="0"/>
               <a:pPr/>
-              <a:t>2/14/2011</a:t>
+              <a:t>4/9/2011</a:t>
             </a:fld>
             <a:endParaRPr lang="en-US"/>
           </a:p>
@@ -1928,7 +1928,7 @@
             <a:fld id="{B4F70677-8E11-4514-95B0-FACEE0366784}" type="datetimeFigureOut">
               <a:rPr lang="en-US" smtClean="0"/>
               <a:pPr/>
-              <a:t>2/14/2011</a:t>
+              <a:t>4/9/2011</a:t>
             </a:fld>
             <a:endParaRPr lang="en-US"/>
           </a:p>
@@ -2347,7 +2347,7 @@
             <a:fld id="{B4F70677-8E11-4514-95B0-FACEE0366784}" type="datetimeFigureOut">
               <a:rPr lang="en-US" smtClean="0"/>
               <a:pPr/>
-              <a:t>2/14/2011</a:t>
+              <a:t>4/9/2011</a:t>
             </a:fld>
             <a:endParaRPr lang="en-US"/>
           </a:p>
@@ -2462,7 +2462,7 @@
             <a:fld id="{B4F70677-8E11-4514-95B0-FACEE0366784}" type="datetimeFigureOut">
               <a:rPr lang="en-US" smtClean="0"/>
               <a:pPr/>
-              <a:t>2/14/2011</a:t>
+              <a:t>4/9/2011</a:t>
             </a:fld>
             <a:endParaRPr lang="en-US"/>
           </a:p>
@@ -2554,7 +2554,7 @@
             <a:fld id="{B4F70677-8E11-4514-95B0-FACEE0366784}" type="datetimeFigureOut">
               <a:rPr lang="en-US" smtClean="0"/>
               <a:pPr/>
-              <a:t>2/14/2011</a:t>
+              <a:t>4/9/2011</a:t>
             </a:fld>
             <a:endParaRPr lang="en-US"/>
           </a:p>
@@ -2828,7 +2828,7 @@
             <a:fld id="{B4F70677-8E11-4514-95B0-FACEE0366784}" type="datetimeFigureOut">
               <a:rPr lang="en-US" smtClean="0"/>
               <a:pPr/>
-              <a:t>2/14/2011</a:t>
+              <a:t>4/9/2011</a:t>
             </a:fld>
             <a:endParaRPr lang="en-US"/>
           </a:p>
@@ -3078,7 +3078,7 @@
             <a:fld id="{B4F70677-8E11-4514-95B0-FACEE0366784}" type="datetimeFigureOut">
               <a:rPr lang="en-US" smtClean="0"/>
               <a:pPr/>
-              <a:t>2/14/2011</a:t>
+              <a:t>4/9/2011</a:t>
             </a:fld>
             <a:endParaRPr lang="en-US"/>
           </a:p>
@@ -3288,7 +3288,7 @@
             <a:fld id="{B4F70677-8E11-4514-95B0-FACEE0366784}" type="datetimeFigureOut">
               <a:rPr lang="en-US" smtClean="0"/>
               <a:pPr/>
-              <a:t>2/14/2011</a:t>
+              <a:t>4/9/2011</a:t>
             </a:fld>
             <a:endParaRPr lang="en-US"/>
           </a:p>
@@ -4791,6 +4791,13 @@
   <p:clrMapOvr>
     <a:masterClrMapping/>
   </p:clrMapOvr>
+  <p:timing>
+    <p:tnLst>
+      <p:par>
+        <p:cTn id="1" dur="indefinite" restart="never" nodeType="tmRoot"/>
+      </p:par>
+    </p:tnLst>
+  </p:timing>
 </p:sld>
 </file>
 
@@ -5220,39 +5227,6 @@
       </p:grpSp>
       <p:cxnSp>
         <p:nvCxnSpPr>
-          <p:cNvPr id="21" name="Straight Arrow Connector 20"/>
-          <p:cNvCxnSpPr/>
-          <p:nvPr/>
-        </p:nvCxnSpPr>
-        <p:spPr>
-          <a:xfrm>
-            <a:off x="2819400" y="2971800"/>
-            <a:ext cx="1828800" cy="914400"/>
-          </a:xfrm>
-          <a:prstGeom prst="straightConnector1">
-            <a:avLst/>
-          </a:prstGeom>
-          <a:ln>
-            <a:tailEnd type="arrow"/>
-          </a:ln>
-        </p:spPr>
-        <p:style>
-          <a:lnRef idx="1">
-            <a:schemeClr val="accent1"/>
-          </a:lnRef>
-          <a:fillRef idx="0">
-            <a:schemeClr val="accent1"/>
-          </a:fillRef>
-          <a:effectRef idx="0">
-            <a:schemeClr val="accent1"/>
-          </a:effectRef>
-          <a:fontRef idx="minor">
-            <a:schemeClr val="tx1"/>
-          </a:fontRef>
-        </p:style>
-      </p:cxnSp>
-      <p:cxnSp>
-        <p:nvCxnSpPr>
           <p:cNvPr id="23" name="Straight Arrow Connector 22"/>
           <p:cNvCxnSpPr/>
           <p:nvPr/>
@@ -5847,171 +5821,16 @@
           </a:p>
         </p:txBody>
       </p:sp>
-      <p:sp>
-        <p:nvSpPr>
-          <p:cNvPr id="28" name="Rounded Rectangle 27"/>
-          <p:cNvSpPr/>
-          <p:nvPr/>
-        </p:nvSpPr>
-        <p:spPr>
-          <a:xfrm>
-            <a:off x="609600" y="2133600"/>
-            <a:ext cx="2209800" cy="838200"/>
-          </a:xfrm>
-          <a:prstGeom prst="roundRect">
-            <a:avLst/>
-          </a:prstGeom>
-          <a:noFill/>
-          <a:ln w="9525"/>
-        </p:spPr>
-        <p:style>
-          <a:lnRef idx="2">
-            <a:schemeClr val="accent1">
-              <a:shade val="50000"/>
-            </a:schemeClr>
-          </a:lnRef>
-          <a:fillRef idx="1">
-            <a:schemeClr val="accent1"/>
-          </a:fillRef>
-          <a:effectRef idx="0">
-            <a:schemeClr val="accent1"/>
-          </a:effectRef>
-          <a:fontRef idx="minor">
-            <a:schemeClr val="lt1"/>
-          </a:fontRef>
-        </p:style>
-        <p:txBody>
-          <a:bodyPr rtlCol="0" anchor="ctr"/>
-          <a:lstStyle/>
-          <a:p>
-            <a:pPr algn="ctr"/>
-            <a:endParaRPr lang="en-US"/>
-          </a:p>
-        </p:txBody>
-      </p:sp>
-      <p:sp>
-        <p:nvSpPr>
-          <p:cNvPr id="30" name="TextBox 29"/>
-          <p:cNvSpPr txBox="1"/>
-          <p:nvPr/>
-        </p:nvSpPr>
-        <p:spPr>
-          <a:xfrm>
-            <a:off x="838200" y="2133600"/>
-            <a:ext cx="1539589" cy="369332"/>
-          </a:xfrm>
-          <a:prstGeom prst="rect">
-            <a:avLst/>
-          </a:prstGeom>
-          <a:noFill/>
-        </p:spPr>
-        <p:txBody>
-          <a:bodyPr wrap="none" rtlCol="0">
-            <a:spAutoFit/>
-          </a:bodyPr>
-          <a:lstStyle/>
-          <a:p>
-            <a:r>
-              <a:rPr lang="en-US" dirty="0" smtClean="0"/>
-              <a:t>Edit Controller</a:t>
-            </a:r>
-            <a:endParaRPr lang="en-US" dirty="0"/>
-          </a:p>
-        </p:txBody>
-      </p:sp>
-      <p:sp>
-        <p:nvSpPr>
-          <p:cNvPr id="35" name="TextBox 34"/>
-          <p:cNvSpPr txBox="1"/>
-          <p:nvPr/>
-        </p:nvSpPr>
-        <p:spPr>
-          <a:xfrm>
-            <a:off x="762000" y="2514600"/>
-            <a:ext cx="762000" cy="461665"/>
-          </a:xfrm>
-          <a:prstGeom prst="rect">
-            <a:avLst/>
-          </a:prstGeom>
-          <a:noFill/>
-        </p:spPr>
-        <p:txBody>
-          <a:bodyPr wrap="square" rtlCol="0">
-            <a:spAutoFit/>
-          </a:bodyPr>
-          <a:lstStyle/>
-          <a:p>
-            <a:r>
-              <a:rPr lang="en-US" sz="800" dirty="0" smtClean="0"/>
-              <a:t>add()</a:t>
-            </a:r>
-          </a:p>
-          <a:p>
-            <a:r>
-              <a:rPr lang="en-US" sz="800" dirty="0" smtClean="0"/>
-              <a:t>delete()</a:t>
-            </a:r>
-          </a:p>
-          <a:p>
-            <a:r>
-              <a:rPr lang="en-US" sz="800" dirty="0" smtClean="0"/>
-              <a:t>modify()</a:t>
-            </a:r>
-          </a:p>
-        </p:txBody>
-      </p:sp>
-      <p:sp>
-        <p:nvSpPr>
-          <p:cNvPr id="38" name="TextBox 37"/>
-          <p:cNvSpPr txBox="1"/>
-          <p:nvPr/>
-        </p:nvSpPr>
-        <p:spPr>
-          <a:xfrm>
-            <a:off x="1676400" y="2514600"/>
-            <a:ext cx="685800" cy="461665"/>
-          </a:xfrm>
-          <a:prstGeom prst="rect">
-            <a:avLst/>
-          </a:prstGeom>
-          <a:noFill/>
-        </p:spPr>
-        <p:txBody>
-          <a:bodyPr wrap="square" rtlCol="0">
-            <a:spAutoFit/>
-          </a:bodyPr>
-          <a:lstStyle/>
-          <a:p>
-            <a:r>
-              <a:rPr lang="en-US" sz="800" dirty="0" smtClean="0"/>
-              <a:t>open()</a:t>
-            </a:r>
-          </a:p>
-          <a:p>
-            <a:r>
-              <a:rPr lang="en-US" sz="800" dirty="0" smtClean="0"/>
-              <a:t>save()</a:t>
-            </a:r>
-          </a:p>
-          <a:p>
-            <a:r>
-              <a:rPr lang="en-US" sz="800" dirty="0" smtClean="0"/>
-              <a:t>close()</a:t>
-            </a:r>
-            <a:endParaRPr lang="en-US" sz="800" dirty="0"/>
-          </a:p>
-        </p:txBody>
-      </p:sp>
       <p:cxnSp>
         <p:nvCxnSpPr>
-          <p:cNvPr id="41" name="Straight Arrow Connector 40"/>
+          <p:cNvPr id="39" name="Straight Arrow Connector 38"/>
           <p:cNvCxnSpPr/>
           <p:nvPr/>
         </p:nvCxnSpPr>
         <p:spPr>
-          <a:xfrm rot="10800000" flipV="1">
-            <a:off x="2895600" y="1600200"/>
-            <a:ext cx="990600" cy="609600"/>
+          <a:xfrm rot="5400000">
+            <a:off x="3326607" y="2678907"/>
+            <a:ext cx="2057401" cy="119063"/>
           </a:xfrm>
           <a:prstGeom prst="straightConnector1">
             <a:avLst/>
@@ -6037,14 +5856,14 @@
       </p:cxnSp>
       <p:cxnSp>
         <p:nvCxnSpPr>
-          <p:cNvPr id="43" name="Straight Arrow Connector 42"/>
+          <p:cNvPr id="44" name="Straight Arrow Connector 43"/>
           <p:cNvCxnSpPr/>
           <p:nvPr/>
         </p:nvCxnSpPr>
         <p:spPr>
-          <a:xfrm rot="10800000" flipV="1">
-            <a:off x="2895600" y="2057400"/>
-            <a:ext cx="3200400" cy="304800"/>
+          <a:xfrm rot="5400000">
+            <a:off x="6107908" y="3078955"/>
+            <a:ext cx="862013" cy="619127"/>
           </a:xfrm>
           <a:prstGeom prst="straightConnector1">
             <a:avLst/>
@@ -6803,6 +6622,13 @@
   <p:clrMapOvr>
     <a:masterClrMapping/>
   </p:clrMapOvr>
+  <p:timing>
+    <p:tnLst>
+      <p:par>
+        <p:cTn id="1" dur="indefinite" restart="never" nodeType="tmRoot"/>
+      </p:par>
+    </p:tnLst>
+  </p:timing>
 </p:sld>
 </file>
 

</xml_diff>